<commit_message>
Nachtrag Arrays und Objekte
</commit_message>
<xml_diff>
--- a/7. Javascript/Slides/JS Arrays und Objekte.pptx
+++ b/7. Javascript/Slides/JS Arrays und Objekte.pptx
@@ -19,8 +19,9 @@
     <p:sldId id="378" r:id="rId13"/>
     <p:sldId id="379" r:id="rId14"/>
     <p:sldId id="404" r:id="rId15"/>
-    <p:sldId id="366" r:id="rId16"/>
-    <p:sldId id="292" r:id="rId17"/>
+    <p:sldId id="406" r:id="rId16"/>
+    <p:sldId id="407" r:id="rId17"/>
+    <p:sldId id="292" r:id="rId18"/>
   </p:sldIdLst>
   <p:sldSz cx="12192000" cy="6858000"/>
   <p:notesSz cx="6858000" cy="9144000"/>
@@ -278,7 +279,7 @@
           <a:p>
             <a:fld id="{B6D41BCC-AD73-4203-A5A6-E62EB28B0FE6}" type="datetimeFigureOut">
               <a:rPr lang="en-US" smtClean="0"/>
-              <a:t>11/6/2023</a:t>
+              <a:t>11/7/2023</a:t>
             </a:fld>
             <a:endParaRPr lang="en-US"/>
           </a:p>
@@ -486,7 +487,7 @@
           <a:p>
             <a:fld id="{B6D41BCC-AD73-4203-A5A6-E62EB28B0FE6}" type="datetimeFigureOut">
               <a:rPr lang="en-US" smtClean="0"/>
-              <a:t>11/6/2023</a:t>
+              <a:t>11/7/2023</a:t>
             </a:fld>
             <a:endParaRPr lang="en-US"/>
           </a:p>
@@ -694,7 +695,7 @@
           <a:p>
             <a:fld id="{B6D41BCC-AD73-4203-A5A6-E62EB28B0FE6}" type="datetimeFigureOut">
               <a:rPr lang="en-US" smtClean="0"/>
-              <a:t>11/6/2023</a:t>
+              <a:t>11/7/2023</a:t>
             </a:fld>
             <a:endParaRPr lang="en-US"/>
           </a:p>
@@ -892,7 +893,7 @@
           <a:p>
             <a:fld id="{B6D41BCC-AD73-4203-A5A6-E62EB28B0FE6}" type="datetimeFigureOut">
               <a:rPr lang="en-US" smtClean="0"/>
-              <a:t>11/6/2023</a:t>
+              <a:t>11/7/2023</a:t>
             </a:fld>
             <a:endParaRPr lang="en-US"/>
           </a:p>
@@ -1301,7 +1302,7 @@
           <a:p>
             <a:fld id="{B6D41BCC-AD73-4203-A5A6-E62EB28B0FE6}" type="datetimeFigureOut">
               <a:rPr lang="en-US" smtClean="0"/>
-              <a:t>11/6/2023</a:t>
+              <a:t>11/7/2023</a:t>
             </a:fld>
             <a:endParaRPr lang="en-US"/>
           </a:p>
@@ -1571,7 +1572,7 @@
           <a:p>
             <a:fld id="{B6D41BCC-AD73-4203-A5A6-E62EB28B0FE6}" type="datetimeFigureOut">
               <a:rPr lang="en-US" smtClean="0"/>
-              <a:t>11/6/2023</a:t>
+              <a:t>11/7/2023</a:t>
             </a:fld>
             <a:endParaRPr lang="en-US"/>
           </a:p>
@@ -1987,7 +1988,7 @@
           <a:p>
             <a:fld id="{B6D41BCC-AD73-4203-A5A6-E62EB28B0FE6}" type="datetimeFigureOut">
               <a:rPr lang="en-US" smtClean="0"/>
-              <a:t>11/6/2023</a:t>
+              <a:t>11/7/2023</a:t>
             </a:fld>
             <a:endParaRPr lang="en-US"/>
           </a:p>
@@ -2128,7 +2129,7 @@
           <a:p>
             <a:fld id="{B6D41BCC-AD73-4203-A5A6-E62EB28B0FE6}" type="datetimeFigureOut">
               <a:rPr lang="en-US" smtClean="0"/>
-              <a:t>11/6/2023</a:t>
+              <a:t>11/7/2023</a:t>
             </a:fld>
             <a:endParaRPr lang="en-US"/>
           </a:p>
@@ -2241,7 +2242,7 @@
           <a:p>
             <a:fld id="{B6D41BCC-AD73-4203-A5A6-E62EB28B0FE6}" type="datetimeFigureOut">
               <a:rPr lang="en-US" smtClean="0"/>
-              <a:t>11/6/2023</a:t>
+              <a:t>11/7/2023</a:t>
             </a:fld>
             <a:endParaRPr lang="en-US"/>
           </a:p>
@@ -2567,7 +2568,7 @@
           <a:p>
             <a:fld id="{B6D41BCC-AD73-4203-A5A6-E62EB28B0FE6}" type="datetimeFigureOut">
               <a:rPr lang="en-US" smtClean="0"/>
-              <a:t>11/6/2023</a:t>
+              <a:t>11/7/2023</a:t>
             </a:fld>
             <a:endParaRPr lang="en-US"/>
           </a:p>
@@ -2855,7 +2856,7 @@
           <a:p>
             <a:fld id="{B6D41BCC-AD73-4203-A5A6-E62EB28B0FE6}" type="datetimeFigureOut">
               <a:rPr lang="en-US" smtClean="0"/>
-              <a:t>11/6/2023</a:t>
+              <a:t>11/7/2023</a:t>
             </a:fld>
             <a:endParaRPr lang="en-US"/>
           </a:p>
@@ -3095,7 +3096,7 @@
             <a:fld id="{B6D41BCC-AD73-4203-A5A6-E62EB28B0FE6}" type="datetimeFigureOut">
               <a:rPr lang="en-US" smtClean="0"/>
               <a:pPr/>
-              <a:t>11/6/2023</a:t>
+              <a:t>11/7/2023</a:t>
             </a:fld>
             <a:endParaRPr lang="en-US"/>
           </a:p>
@@ -3569,7 +3570,7 @@
                 <a16:creationId xmlns:a16="http://schemas.microsoft.com/office/drawing/2014/main" id="{BE229233-9672-4675-99B7-6CBCEF1CD415}"/>
               </a:ext>
               <a:ext uri="{C183D7F6-B498-43B3-948B-1728B52AA6E4}">
-                <adec:decorative xmlns:adec="http://schemas.microsoft.com/office/drawing/2017/decorative" xmlns="" val="1"/>
+                <adec:decorative xmlns="" xmlns:adec="http://schemas.microsoft.com/office/drawing/2017/decorative" val="1"/>
               </a:ext>
             </a:extLst>
           </p:cNvPr>
@@ -3664,7 +3665,7 @@
                 <a16:creationId xmlns:a16="http://schemas.microsoft.com/office/drawing/2014/main" id="{EC5FF010-B53C-46BE-BEEF-AF926A00F67F}"/>
               </a:ext>
               <a:ext uri="{C183D7F6-B498-43B3-948B-1728B52AA6E4}">
-                <adec:decorative xmlns:adec="http://schemas.microsoft.com/office/drawing/2017/decorative" xmlns="" val="1"/>
+                <adec:decorative xmlns="" xmlns:adec="http://schemas.microsoft.com/office/drawing/2017/decorative" val="1"/>
               </a:ext>
             </a:extLst>
           </p:cNvPr>
@@ -3730,7 +3731,7 @@
                 <a16:creationId xmlns:a16="http://schemas.microsoft.com/office/drawing/2014/main" id="{8509AD9C-1F43-4138-A72B-8CA988EDD475}"/>
               </a:ext>
               <a:ext uri="{C183D7F6-B498-43B3-948B-1728B52AA6E4}">
-                <adec:decorative xmlns:adec="http://schemas.microsoft.com/office/drawing/2017/decorative" xmlns="" val="1"/>
+                <adec:decorative xmlns="" xmlns:adec="http://schemas.microsoft.com/office/drawing/2017/decorative" val="1"/>
               </a:ext>
             </a:extLst>
           </p:cNvPr>
@@ -3820,10 +3821,6 @@
             <a:r>
               <a:rPr lang="de-AT" sz="2800" dirty="0" smtClean="0"/>
               <a:t>JavaScript </a:t>
-            </a:r>
-            <a:r>
-              <a:rPr lang="de-AT" sz="2800" dirty="0" smtClean="0"/>
-              <a:t/>
             </a:r>
             <a:br>
               <a:rPr lang="de-AT" sz="2800" dirty="0" smtClean="0"/>
@@ -4942,7 +4939,6 @@
               <a:rPr lang="en-US" dirty="0"/>
               <a:t>.</a:t>
             </a:r>
-            <a:endParaRPr lang="en-US" dirty="0"/>
           </a:p>
         </p:txBody>
       </p:sp>
@@ -5284,15 +5280,7 @@
           <a:p>
             <a:r>
               <a:rPr lang="de-AT" dirty="0" smtClean="0"/>
-              <a:t>Übungen </a:t>
-            </a:r>
-            <a:r>
-              <a:rPr lang="de-AT" dirty="0" smtClean="0"/>
-              <a:t>zu </a:t>
-            </a:r>
-            <a:r>
-              <a:rPr lang="de-AT" dirty="0" smtClean="0"/>
-              <a:t>Arrays &amp; Objekte</a:t>
+              <a:t>Übungen zu Arrays &amp; Objekte</a:t>
             </a:r>
             <a:endParaRPr lang="en-US" dirty="0"/>
           </a:p>
@@ -5576,8 +5564,8 @@
           <a:lstStyle/>
           <a:p>
             <a:r>
-              <a:rPr lang="de-AT" dirty="0" smtClean="0"/>
-              <a:t>JavaScript Übungen als Wiederholung</a:t>
+              <a:rPr lang="de-AT" dirty="0" err="1" smtClean="0"/>
+              <a:t>Konstruktorfunktion</a:t>
             </a:r>
             <a:endParaRPr lang="en-US" dirty="0"/>
           </a:p>
@@ -5593,116 +5581,259 @@
             <p:ph idx="1"/>
           </p:nvPr>
         </p:nvSpPr>
-        <p:spPr/>
-        <p:txBody>
-          <a:bodyPr/>
+        <p:spPr>
+          <a:xfrm>
+            <a:off x="767861" y="1989193"/>
+            <a:ext cx="6037385" cy="4137259"/>
+          </a:xfrm>
+        </p:spPr>
+        <p:txBody>
+          <a:bodyPr>
+            <a:normAutofit/>
+          </a:bodyPr>
           <a:lstStyle/>
           <a:p>
             <a:r>
-              <a:rPr lang="de-AT" dirty="0">
-                <a:hlinkClick r:id="rId2"/>
-              </a:rPr>
-              <a:t>https://</a:t>
-            </a:r>
-            <a:r>
-              <a:rPr lang="de-AT" dirty="0" smtClean="0">
-                <a:hlinkClick r:id="rId2"/>
-              </a:rPr>
-              <a:t>www.w3schools.com/js/exercise_js.asp?filename=exercise_js_functions1</a:t>
-            </a:r>
-            <a:r>
-              <a:rPr lang="de-AT" dirty="0" smtClean="0"/>
-              <a:t>  </a:t>
-            </a:r>
-            <a:endParaRPr lang="de-AT" dirty="0"/>
-          </a:p>
-          <a:p>
-            <a:r>
-              <a:rPr lang="de-AT" dirty="0" err="1" smtClean="0"/>
-              <a:t>Functions</a:t>
-            </a:r>
-            <a:endParaRPr lang="de-AT" dirty="0" smtClean="0"/>
-          </a:p>
-          <a:p>
-            <a:r>
-              <a:rPr lang="de-AT" dirty="0" err="1" smtClean="0"/>
-              <a:t>Conditions</a:t>
-            </a:r>
-            <a:endParaRPr lang="de-AT" dirty="0" smtClean="0"/>
-          </a:p>
-          <a:p>
-            <a:r>
-              <a:rPr lang="de-AT" dirty="0" smtClean="0"/>
-              <a:t>Switch</a:t>
-            </a:r>
-          </a:p>
-          <a:p>
-            <a:endParaRPr lang="en-US" dirty="0"/>
+              <a:rPr lang="de-DE" dirty="0" err="1"/>
+              <a:t>Konstruktorfunktionen</a:t>
+            </a:r>
+            <a:r>
+              <a:rPr lang="de-DE" dirty="0"/>
+              <a:t> werden verwendet, um Objekte mit gleicher Struktur und Verhalten zu erstellen.</a:t>
+            </a:r>
+          </a:p>
+          <a:p>
+            <a:r>
+              <a:rPr lang="de-DE" dirty="0"/>
+              <a:t>Sie verwenden das '</a:t>
+            </a:r>
+            <a:r>
+              <a:rPr lang="de-DE" dirty="0" err="1"/>
+              <a:t>new</a:t>
+            </a:r>
+            <a:r>
+              <a:rPr lang="de-DE" dirty="0"/>
+              <a:t>'-Schlüsselwort und '</a:t>
+            </a:r>
+            <a:r>
+              <a:rPr lang="de-DE" dirty="0" err="1"/>
+              <a:t>this</a:t>
+            </a:r>
+            <a:r>
+              <a:rPr lang="de-DE" dirty="0"/>
+              <a:t>', um Eigenschaften und Methoden dem erstellten Objekt zuzuweisen.</a:t>
+            </a:r>
+          </a:p>
+          <a:p>
+            <a:r>
+              <a:rPr lang="de-DE" dirty="0"/>
+              <a:t>Konventionell sind </a:t>
+            </a:r>
+            <a:r>
+              <a:rPr lang="de-DE" dirty="0" err="1"/>
+              <a:t>Konstruktorfunktionen</a:t>
+            </a:r>
+            <a:r>
+              <a:rPr lang="de-DE" dirty="0"/>
+              <a:t> mit einem Anfangsbuchstaben in Großbuchstaben benannt.</a:t>
+            </a:r>
           </a:p>
         </p:txBody>
       </p:sp>
       <p:pic>
         <p:nvPicPr>
-          <p:cNvPr id="5122" name="Picture 2" descr="W3Schools - Վիքիպեդիա՝ ազատ հանրագիտարան"/>
+          <p:cNvPr id="6" name="Grafik 5"/>
           <p:cNvPicPr>
-            <a:picLocks noChangeAspect="1" noChangeArrowheads="1"/>
+            <a:picLocks noChangeAspect="1"/>
           </p:cNvPicPr>
           <p:nvPr/>
         </p:nvPicPr>
         <p:blipFill>
-          <a:blip r:embed="rId3" cstate="hqprint">
-            <a:extLst>
-              <a:ext uri="{28A0092B-C50C-407E-A947-70E740481C1C}">
-                <a14:useLocalDpi xmlns:a14="http://schemas.microsoft.com/office/drawing/2010/main" val="0"/>
-              </a:ext>
-            </a:extLst>
-          </a:blip>
-          <a:srcRect/>
+          <a:blip r:embed="rId2"/>
           <a:stretch>
             <a:fillRect/>
           </a:stretch>
         </p:blipFill>
-        <p:spPr bwMode="auto">
+        <p:spPr>
           <a:xfrm>
-            <a:off x="5806440" y="2809467"/>
-            <a:ext cx="3088112" cy="2915693"/>
+            <a:off x="6896099" y="2057400"/>
+            <a:ext cx="5070824" cy="3595280"/>
           </a:xfrm>
           <a:prstGeom prst="rect">
             <a:avLst/>
           </a:prstGeom>
-          <a:noFill/>
-          <a:extLst>
-            <a:ext uri="{909E8E84-426E-40DD-AFC4-6F175D3DCCD1}">
-              <a14:hiddenFill xmlns:a14="http://schemas.microsoft.com/office/drawing/2010/main">
-                <a:solidFill>
-                  <a:srgbClr val="FFFFFF"/>
-                </a:solidFill>
-              </a14:hiddenFill>
-            </a:ext>
-          </a:extLst>
         </p:spPr>
       </p:pic>
     </p:spTree>
     <p:extLst>
       <p:ext uri="{BB962C8B-B14F-4D97-AF65-F5344CB8AC3E}">
-        <p14:creationId xmlns:p14="http://schemas.microsoft.com/office/powerpoint/2010/main" val="1994412104"/>
+        <p14:creationId xmlns:p14="http://schemas.microsoft.com/office/powerpoint/2010/main" val="51085924"/>
       </p:ext>
     </p:extLst>
   </p:cSld>
   <p:clrMapOvr>
     <a:masterClrMapping/>
   </p:clrMapOvr>
-  <p:timing>
-    <p:tnLst>
-      <p:par>
-        <p:cTn id="1" dur="indefinite" restart="never" nodeType="tmRoot"/>
-      </p:par>
-    </p:tnLst>
-  </p:timing>
 </p:sld>
 </file>
 
 <file path=ppt/slides/slide16.xml><?xml version="1.0" encoding="utf-8"?>
+<p:sld xmlns:a="http://schemas.openxmlformats.org/drawingml/2006/main" xmlns:r="http://schemas.openxmlformats.org/officeDocument/2006/relationships" xmlns:p="http://schemas.openxmlformats.org/presentationml/2006/main">
+  <p:cSld>
+    <p:spTree>
+      <p:nvGrpSpPr>
+        <p:cNvPr id="1" name=""/>
+        <p:cNvGrpSpPr/>
+        <p:nvPr/>
+      </p:nvGrpSpPr>
+      <p:grpSpPr>
+        <a:xfrm>
+          <a:off x="0" y="0"/>
+          <a:ext cx="0" cy="0"/>
+          <a:chOff x="0" y="0"/>
+          <a:chExt cx="0" cy="0"/>
+        </a:xfrm>
+      </p:grpSpPr>
+      <p:sp>
+        <p:nvSpPr>
+          <p:cNvPr id="2" name="Titel 1"/>
+          <p:cNvSpPr>
+            <a:spLocks noGrp="1"/>
+          </p:cNvSpPr>
+          <p:nvPr>
+            <p:ph type="title"/>
+          </p:nvPr>
+        </p:nvSpPr>
+        <p:spPr/>
+        <p:txBody>
+          <a:bodyPr/>
+          <a:lstStyle/>
+          <a:p>
+            <a:r>
+              <a:rPr lang="de-AT" dirty="0" smtClean="0"/>
+              <a:t>Factory Pattern</a:t>
+            </a:r>
+            <a:endParaRPr lang="en-US" dirty="0"/>
+          </a:p>
+        </p:txBody>
+      </p:sp>
+      <p:sp>
+        <p:nvSpPr>
+          <p:cNvPr id="3" name="Inhaltsplatzhalter 2"/>
+          <p:cNvSpPr>
+            <a:spLocks noGrp="1"/>
+          </p:cNvSpPr>
+          <p:nvPr>
+            <p:ph idx="1"/>
+          </p:nvPr>
+        </p:nvSpPr>
+        <p:spPr>
+          <a:xfrm>
+            <a:off x="747347" y="1951892"/>
+            <a:ext cx="5723792" cy="4242767"/>
+          </a:xfrm>
+        </p:spPr>
+        <p:txBody>
+          <a:bodyPr/>
+          <a:lstStyle/>
+          <a:p>
+            <a:r>
+              <a:rPr lang="de-DE" dirty="0" smtClean="0"/>
+              <a:t>Das </a:t>
+            </a:r>
+            <a:r>
+              <a:rPr lang="de-DE" dirty="0"/>
+              <a:t>Fabrikmuster ermöglicht die Erstellung von Objekten ohne Verwendung des '</a:t>
+            </a:r>
+            <a:r>
+              <a:rPr lang="de-DE" dirty="0" err="1"/>
+              <a:t>new</a:t>
+            </a:r>
+            <a:r>
+              <a:rPr lang="de-DE" dirty="0"/>
+              <a:t>'-</a:t>
+            </a:r>
+            <a:r>
+              <a:rPr lang="de-DE" dirty="0" smtClean="0"/>
+              <a:t>Schlüsselworts</a:t>
+            </a:r>
+          </a:p>
+          <a:p>
+            <a:r>
+              <a:rPr lang="de-DE" dirty="0" smtClean="0"/>
+              <a:t>Es </a:t>
+            </a:r>
+            <a:r>
+              <a:rPr lang="de-DE" dirty="0"/>
+              <a:t>verwendet eine Funktion, die ein Objekt mit Eigenschaften und möglicherweise Methoden </a:t>
+            </a:r>
+            <a:r>
+              <a:rPr lang="de-DE" dirty="0" smtClean="0"/>
+              <a:t>zurückgibt</a:t>
+            </a:r>
+            <a:endParaRPr lang="de-DE" dirty="0"/>
+          </a:p>
+          <a:p>
+            <a:r>
+              <a:rPr lang="de-DE" dirty="0" smtClean="0"/>
+              <a:t> </a:t>
+            </a:r>
+            <a:r>
+              <a:rPr lang="de-DE" dirty="0"/>
+              <a:t>Dieses Muster ist flexibler und erlaubt mehr Kontrolle über den Erstellungsprozess. </a:t>
+            </a:r>
+            <a:endParaRPr lang="de-DE" dirty="0"/>
+          </a:p>
+          <a:p>
+            <a:r>
+              <a:rPr lang="de-DE" dirty="0" smtClean="0"/>
+              <a:t>Es </a:t>
+            </a:r>
+            <a:r>
+              <a:rPr lang="de-DE" dirty="0"/>
+              <a:t>erleichtert die Erstellung von Objekten mit unterschiedlichen Eigenschaftswerten basierend auf den übergebenen Parametern.</a:t>
+            </a:r>
+          </a:p>
+        </p:txBody>
+      </p:sp>
+      <p:pic>
+        <p:nvPicPr>
+          <p:cNvPr id="4" name="Grafik 3"/>
+          <p:cNvPicPr>
+            <a:picLocks noChangeAspect="1"/>
+          </p:cNvPicPr>
+          <p:nvPr/>
+        </p:nvPicPr>
+        <p:blipFill>
+          <a:blip r:embed="rId2"/>
+          <a:stretch>
+            <a:fillRect/>
+          </a:stretch>
+        </p:blipFill>
+        <p:spPr>
+          <a:xfrm>
+            <a:off x="6318358" y="2174788"/>
+            <a:ext cx="5664921" cy="2458757"/>
+          </a:xfrm>
+          <a:prstGeom prst="rect">
+            <a:avLst/>
+          </a:prstGeom>
+        </p:spPr>
+      </p:pic>
+    </p:spTree>
+    <p:extLst>
+      <p:ext uri="{BB962C8B-B14F-4D97-AF65-F5344CB8AC3E}">
+        <p14:creationId xmlns:p14="http://schemas.microsoft.com/office/powerpoint/2010/main" val="3111998224"/>
+      </p:ext>
+    </p:extLst>
+  </p:cSld>
+  <p:clrMapOvr>
+    <a:masterClrMapping/>
+  </p:clrMapOvr>
+</p:sld>
+</file>
+
+<file path=ppt/slides/slide17.xml><?xml version="1.0" encoding="utf-8"?>
 <p:sld xmlns:a="http://schemas.openxmlformats.org/drawingml/2006/main" xmlns:r="http://schemas.openxmlformats.org/officeDocument/2006/relationships" xmlns:p="http://schemas.openxmlformats.org/presentationml/2006/main">
   <p:cSld>
     <p:spTree>
@@ -6085,7 +6216,7 @@
                 <a16:creationId xmlns:a16="http://schemas.microsoft.com/office/drawing/2014/main" id="{BE229233-9672-4675-99B7-6CBCEF1CD415}"/>
               </a:ext>
               <a:ext uri="{C183D7F6-B498-43B3-948B-1728B52AA6E4}">
-                <adec:decorative xmlns:adec="http://schemas.microsoft.com/office/drawing/2017/decorative" xmlns="" val="1"/>
+                <adec:decorative xmlns="" xmlns:adec="http://schemas.microsoft.com/office/drawing/2017/decorative" val="1"/>
               </a:ext>
             </a:extLst>
           </p:cNvPr>
@@ -6180,7 +6311,7 @@
                 <a16:creationId xmlns:a16="http://schemas.microsoft.com/office/drawing/2014/main" id="{EC5FF010-B53C-46BE-BEEF-AF926A00F67F}"/>
               </a:ext>
               <a:ext uri="{C183D7F6-B498-43B3-948B-1728B52AA6E4}">
-                <adec:decorative xmlns:adec="http://schemas.microsoft.com/office/drawing/2017/decorative" xmlns="" val="1"/>
+                <adec:decorative xmlns="" xmlns:adec="http://schemas.microsoft.com/office/drawing/2017/decorative" val="1"/>
               </a:ext>
             </a:extLst>
           </p:cNvPr>
@@ -6246,7 +6377,7 @@
                 <a16:creationId xmlns:a16="http://schemas.microsoft.com/office/drawing/2014/main" id="{8509AD9C-1F43-4138-A72B-8CA988EDD475}"/>
               </a:ext>
               <a:ext uri="{C183D7F6-B498-43B3-948B-1728B52AA6E4}">
-                <adec:decorative xmlns:adec="http://schemas.microsoft.com/office/drawing/2017/decorative" xmlns="" val="1"/>
+                <adec:decorative xmlns="" xmlns:adec="http://schemas.microsoft.com/office/drawing/2017/decorative" val="1"/>
               </a:ext>
             </a:extLst>
           </p:cNvPr>
@@ -6514,7 +6645,6 @@
               <a:rPr lang="en-US" dirty="0"/>
               <a:t>.</a:t>
             </a:r>
-            <a:endParaRPr lang="en-US" dirty="0"/>
           </a:p>
         </p:txBody>
       </p:sp>
@@ -6929,7 +7059,6 @@
               <a:rPr lang="de-DE" dirty="0"/>
               <a:t>ist in JS kein Laufzeitfehler!</a:t>
             </a:r>
-            <a:endParaRPr lang="de-DE" dirty="0"/>
           </a:p>
         </p:txBody>
       </p:sp>
@@ -7414,7 +7543,6 @@
               <a:rPr lang="en-US" dirty="0"/>
               <a:t>.</a:t>
             </a:r>
-            <a:endParaRPr lang="en-US" dirty="0"/>
           </a:p>
         </p:txBody>
       </p:sp>
@@ -8146,11 +8274,7 @@
           <a:p>
             <a:r>
               <a:rPr lang="de-AT" dirty="0" smtClean="0"/>
-              <a:t>Übung zu </a:t>
-            </a:r>
-            <a:r>
-              <a:rPr lang="de-AT" dirty="0" smtClean="0"/>
-              <a:t>Arrays „Wer bezahlt die Rechnung“</a:t>
+              <a:t>Übung zu Arrays „Wer bezahlt die Rechnung“</a:t>
             </a:r>
             <a:endParaRPr lang="en-US" dirty="0"/>
           </a:p>
@@ -8365,7 +8489,7 @@
                 <a16:creationId xmlns:a16="http://schemas.microsoft.com/office/drawing/2014/main" id="{BE229233-9672-4675-99B7-6CBCEF1CD415}"/>
               </a:ext>
               <a:ext uri="{C183D7F6-B498-43B3-948B-1728B52AA6E4}">
-                <adec:decorative xmlns:adec="http://schemas.microsoft.com/office/drawing/2017/decorative" xmlns="" val="1"/>
+                <adec:decorative xmlns="" xmlns:adec="http://schemas.microsoft.com/office/drawing/2017/decorative" val="1"/>
               </a:ext>
             </a:extLst>
           </p:cNvPr>
@@ -8460,7 +8584,7 @@
                 <a16:creationId xmlns:a16="http://schemas.microsoft.com/office/drawing/2014/main" id="{EC5FF010-B53C-46BE-BEEF-AF926A00F67F}"/>
               </a:ext>
               <a:ext uri="{C183D7F6-B498-43B3-948B-1728B52AA6E4}">
-                <adec:decorative xmlns:adec="http://schemas.microsoft.com/office/drawing/2017/decorative" xmlns="" val="1"/>
+                <adec:decorative xmlns="" xmlns:adec="http://schemas.microsoft.com/office/drawing/2017/decorative" val="1"/>
               </a:ext>
             </a:extLst>
           </p:cNvPr>
@@ -8526,7 +8650,7 @@
                 <a16:creationId xmlns:a16="http://schemas.microsoft.com/office/drawing/2014/main" id="{8509AD9C-1F43-4138-A72B-8CA988EDD475}"/>
               </a:ext>
               <a:ext uri="{C183D7F6-B498-43B3-948B-1728B52AA6E4}">
-                <adec:decorative xmlns:adec="http://schemas.microsoft.com/office/drawing/2017/decorative" xmlns="" val="1"/>
+                <adec:decorative xmlns="" xmlns:adec="http://schemas.microsoft.com/office/drawing/2017/decorative" val="1"/>
               </a:ext>
             </a:extLst>
           </p:cNvPr>

</xml_diff>